<commit_message>
Added more details to presentation
</commit_message>
<xml_diff>
--- a/StructuredLogging.pptx
+++ b/StructuredLogging.pptx
@@ -110,6 +110,11 @@
       </a:defRPr>
     </a:lvl9pPr>
   </p:defaultTextStyle>
+  <p:extLst>
+    <p:ext uri="{EFAFB233-063F-42B5-8137-9DF3F51BA10A}">
+      <p15:sldGuideLst xmlns:p15="http://schemas.microsoft.com/office/powerpoint/2012/main"/>
+    </p:ext>
+  </p:extLst>
 </p:presentation>
 </file>
 
@@ -260,7 +265,7 @@
           <a:p>
             <a:fld id="{A19B93BB-EFBE-46FF-9561-0C7630E57D6C}" type="datetimeFigureOut">
               <a:rPr lang="en-US" smtClean="0"/>
-              <a:t>3/13/2019</a:t>
+              <a:t>3/31/2019</a:t>
             </a:fld>
             <a:endParaRPr lang="en-US"/>
           </a:p>
@@ -458,7 +463,7 @@
           <a:p>
             <a:fld id="{A19B93BB-EFBE-46FF-9561-0C7630E57D6C}" type="datetimeFigureOut">
               <a:rPr lang="en-US" smtClean="0"/>
-              <a:t>3/13/2019</a:t>
+              <a:t>3/31/2019</a:t>
             </a:fld>
             <a:endParaRPr lang="en-US"/>
           </a:p>
@@ -666,7 +671,7 @@
           <a:p>
             <a:fld id="{A19B93BB-EFBE-46FF-9561-0C7630E57D6C}" type="datetimeFigureOut">
               <a:rPr lang="en-US" smtClean="0"/>
-              <a:t>3/13/2019</a:t>
+              <a:t>3/31/2019</a:t>
             </a:fld>
             <a:endParaRPr lang="en-US"/>
           </a:p>
@@ -864,7 +869,7 @@
           <a:p>
             <a:fld id="{A19B93BB-EFBE-46FF-9561-0C7630E57D6C}" type="datetimeFigureOut">
               <a:rPr lang="en-US" smtClean="0"/>
-              <a:t>3/13/2019</a:t>
+              <a:t>3/31/2019</a:t>
             </a:fld>
             <a:endParaRPr lang="en-US"/>
           </a:p>
@@ -1139,7 +1144,7 @@
           <a:p>
             <a:fld id="{A19B93BB-EFBE-46FF-9561-0C7630E57D6C}" type="datetimeFigureOut">
               <a:rPr lang="en-US" smtClean="0"/>
-              <a:t>3/13/2019</a:t>
+              <a:t>3/31/2019</a:t>
             </a:fld>
             <a:endParaRPr lang="en-US"/>
           </a:p>
@@ -1404,7 +1409,7 @@
           <a:p>
             <a:fld id="{A19B93BB-EFBE-46FF-9561-0C7630E57D6C}" type="datetimeFigureOut">
               <a:rPr lang="en-US" smtClean="0"/>
-              <a:t>3/13/2019</a:t>
+              <a:t>3/31/2019</a:t>
             </a:fld>
             <a:endParaRPr lang="en-US"/>
           </a:p>
@@ -1816,7 +1821,7 @@
           <a:p>
             <a:fld id="{A19B93BB-EFBE-46FF-9561-0C7630E57D6C}" type="datetimeFigureOut">
               <a:rPr lang="en-US" smtClean="0"/>
-              <a:t>3/13/2019</a:t>
+              <a:t>3/31/2019</a:t>
             </a:fld>
             <a:endParaRPr lang="en-US"/>
           </a:p>
@@ -1957,7 +1962,7 @@
           <a:p>
             <a:fld id="{A19B93BB-EFBE-46FF-9561-0C7630E57D6C}" type="datetimeFigureOut">
               <a:rPr lang="en-US" smtClean="0"/>
-              <a:t>3/13/2019</a:t>
+              <a:t>3/31/2019</a:t>
             </a:fld>
             <a:endParaRPr lang="en-US"/>
           </a:p>
@@ -2070,7 +2075,7 @@
           <a:p>
             <a:fld id="{A19B93BB-EFBE-46FF-9561-0C7630E57D6C}" type="datetimeFigureOut">
               <a:rPr lang="en-US" smtClean="0"/>
-              <a:t>3/13/2019</a:t>
+              <a:t>3/31/2019</a:t>
             </a:fld>
             <a:endParaRPr lang="en-US"/>
           </a:p>
@@ -2381,7 +2386,7 @@
           <a:p>
             <a:fld id="{A19B93BB-EFBE-46FF-9561-0C7630E57D6C}" type="datetimeFigureOut">
               <a:rPr lang="en-US" smtClean="0"/>
-              <a:t>3/13/2019</a:t>
+              <a:t>3/31/2019</a:t>
             </a:fld>
             <a:endParaRPr lang="en-US"/>
           </a:p>
@@ -2669,7 +2674,7 @@
           <a:p>
             <a:fld id="{A19B93BB-EFBE-46FF-9561-0C7630E57D6C}" type="datetimeFigureOut">
               <a:rPr lang="en-US" smtClean="0"/>
-              <a:t>3/13/2019</a:t>
+              <a:t>3/31/2019</a:t>
             </a:fld>
             <a:endParaRPr lang="en-US"/>
           </a:p>
@@ -2910,7 +2915,7 @@
           <a:p>
             <a:fld id="{A19B93BB-EFBE-46FF-9561-0C7630E57D6C}" type="datetimeFigureOut">
               <a:rPr lang="en-US" smtClean="0"/>
-              <a:t>3/13/2019</a:t>
+              <a:t>3/31/2019</a:t>
             </a:fld>
             <a:endParaRPr lang="en-US"/>
           </a:p>
@@ -3548,7 +3553,7 @@
           <a:p>
             <a:r>
               <a:rPr lang="en-US" dirty="0"/>
-              <a:t>TransUnion Healthcare Fort Worth’s Problem</a:t>
+              <a:t>TransUnion Healthcare Fort Worth</a:t>
             </a:r>
           </a:p>
         </p:txBody>
@@ -3582,13 +3587,13 @@
           <a:p>
             <a:r>
               <a:rPr lang="en-US" dirty="0"/>
-              <a:t>3 different products (need a note about the number of repositories and individual applications), 9,000 databases</a:t>
+              <a:t>3 products, 60+ repositories, 40+ applications, 9K+ databases</a:t>
             </a:r>
           </a:p>
           <a:p>
             <a:r>
               <a:rPr lang="en-US" dirty="0"/>
-              <a:t>6ish environments: Local, CI, Pre-QA, QA, Regression, Production</a:t>
+              <a:t>6 environments: Local, CI, Pre-QA, QA, Regression, Production</a:t>
             </a:r>
           </a:p>
           <a:p>
@@ -3692,6 +3697,12 @@
           <a:p>
             <a:r>
               <a:rPr lang="en-US" dirty="0"/>
+              <a:t>Often to a set of text files</a:t>
+            </a:r>
+          </a:p>
+          <a:p>
+            <a:r>
+              <a:rPr lang="en-US" dirty="0"/>
               <a:t>Hard to track a single event across multiple systems</a:t>
             </a:r>
           </a:p>
@@ -3699,6 +3710,18 @@
             <a:r>
               <a:rPr lang="en-US" dirty="0"/>
               <a:t>Lacks context of what was going on during the events</a:t>
+            </a:r>
+          </a:p>
+          <a:p>
+            <a:r>
+              <a:rPr lang="en-US" dirty="0"/>
+              <a:t>How do you filter to see a particular event, and at the same time filter on some property?</a:t>
+            </a:r>
+          </a:p>
+          <a:p>
+            <a:r>
+              <a:rPr lang="en-US" dirty="0"/>
+              <a:t>How to log complex objects?</a:t>
             </a:r>
           </a:p>
         </p:txBody>
@@ -3793,6 +3816,53 @@
               <a:t>Context can be a primitive type, or a complex object</a:t>
             </a:r>
           </a:p>
+          <a:p>
+            <a:r>
+              <a:rPr lang="en-US" dirty="0"/>
+              <a:t>Each event is assigned a type or identifier</a:t>
+            </a:r>
+          </a:p>
+          <a:p>
+            <a:r>
+              <a:rPr lang="en-US" dirty="0"/>
+              <a:t>Tools that understand the structured logging format can do advanced filtering and allow you to drill down into properties</a:t>
+            </a:r>
+          </a:p>
+          <a:p>
+            <a:r>
+              <a:rPr lang="en-US" dirty="0"/>
+              <a:t>Supported by </a:t>
+            </a:r>
+            <a:r>
+              <a:rPr lang="en-US" dirty="0" err="1"/>
+              <a:t>Serilog</a:t>
+            </a:r>
+            <a:r>
+              <a:rPr lang="en-US" dirty="0"/>
+              <a:t>, </a:t>
+            </a:r>
+            <a:r>
+              <a:rPr lang="en-US" dirty="0" err="1"/>
+              <a:t>NLog</a:t>
+            </a:r>
+            <a:r>
+              <a:rPr lang="en-US" dirty="0"/>
+              <a:t>, </a:t>
+            </a:r>
+            <a:r>
+              <a:rPr lang="en-US" dirty="0" err="1"/>
+              <a:t>LibLog</a:t>
+            </a:r>
+            <a:r>
+              <a:rPr lang="en-US" dirty="0"/>
+              <a:t>, and </a:t>
+            </a:r>
+            <a:r>
+              <a:rPr lang="en-US" dirty="0" err="1"/>
+              <a:t>Microsoft.Extensions.Logging</a:t>
+            </a:r>
+            <a:endParaRPr lang="en-US" dirty="0"/>
+          </a:p>
         </p:txBody>
       </p:sp>
     </p:spTree>
@@ -3899,7 +3969,7 @@
             </a:r>
             <a:r>
               <a:rPr lang="en-US" dirty="0"/>
-              <a:t>/</a:t>
+              <a:t>, </a:t>
             </a:r>
             <a:r>
               <a:rPr lang="en-US" dirty="0" err="1"/>
@@ -3918,7 +3988,7 @@
           <a:p>
             <a:r>
               <a:rPr lang="en-US" dirty="0"/>
-              <a:t>Enrich events with context</a:t>
+              <a:t>Enrich events with context (properties that apply to all events within a certain scope)</a:t>
             </a:r>
           </a:p>
           <a:p>
@@ -4017,6 +4087,12 @@
             <a:r>
               <a:rPr lang="en-US" dirty="0"/>
               <a:t>Powerful and simple query language</a:t>
+            </a:r>
+          </a:p>
+          <a:p>
+            <a:r>
+              <a:rPr lang="en-US" dirty="0"/>
+              <a:t>Filters called signals</a:t>
             </a:r>
           </a:p>
           <a:p>

</xml_diff>